<commit_message>
Fixed a minor detail on PPT
</commit_message>
<xml_diff>
--- a/reports/Week 4 Presentation/Compiled Presentation 1.pptx
+++ b/reports/Week 4 Presentation/Compiled Presentation 1.pptx
@@ -20352,8 +20352,24 @@
             </a:pPr>
             <a:r>
               <a:rPr lang="en-US" dirty="0"/>
-              <a:t>Learn more about imbalance.</a:t>
+              <a:t>Learn more about imbalance;</a:t>
             </a:r>
+          </a:p>
+          <a:p>
+            <a:pPr marL="285750" indent="-285750">
+              <a:spcAft>
+                <a:spcPts val="1200"/>
+              </a:spcAft>
+            </a:pPr>
+            <a:r>
+              <a:rPr lang="en-US" dirty="0"/>
+              <a:t>Learn how to work on branches </a:t>
+            </a:r>
+            <a:r>
+              <a:rPr lang="en-US"/>
+              <a:t>on GitHub</a:t>
+            </a:r>
+            <a:endParaRPr lang="en-US" dirty="0"/>
           </a:p>
         </p:txBody>
       </p:sp>

</xml_diff>